<commit_message>
clean arch pptx update
</commit_message>
<xml_diff>
--- a/CleanCodeCleanArch/CleanCodeCleanArch.pptx
+++ b/CleanCodeCleanArch/CleanCodeCleanArch.pptx
@@ -3585,7 +3585,7 @@
           <a:p>
             <a:fld id="{C30C270E-9714-422B-B7EA-B510AECAFD34}" type="datetimeFigureOut">
               <a:rPr lang="pl-PL" smtClean="0"/>
-              <a:t>14.05.2020</a:t>
+              <a:t>07.07.2020</a:t>
             </a:fld>
             <a:endParaRPr lang="pl-PL"/>
           </a:p>
@@ -4801,7 +4801,7 @@
           <a:p>
             <a:fld id="{96D30BF6-FA71-4576-A5BC-BB4B1D1254CD}" type="datetimeFigureOut">
               <a:rPr lang="pl-PL" smtClean="0"/>
-              <a:t>14.05.2020</a:t>
+              <a:t>07.07.2020</a:t>
             </a:fld>
             <a:endParaRPr lang="pl-PL"/>
           </a:p>
@@ -5087,7 +5087,7 @@
           <a:p>
             <a:fld id="{96D30BF6-FA71-4576-A5BC-BB4B1D1254CD}" type="datetimeFigureOut">
               <a:rPr lang="pl-PL" smtClean="0"/>
-              <a:t>14.05.2020</a:t>
+              <a:t>07.07.2020</a:t>
             </a:fld>
             <a:endParaRPr lang="pl-PL"/>
           </a:p>
@@ -5279,7 +5279,7 @@
           <a:p>
             <a:fld id="{96D30BF6-FA71-4576-A5BC-BB4B1D1254CD}" type="datetimeFigureOut">
               <a:rPr lang="pl-PL" smtClean="0"/>
-              <a:t>14.05.2020</a:t>
+              <a:t>07.07.2020</a:t>
             </a:fld>
             <a:endParaRPr lang="pl-PL"/>
           </a:p>
@@ -5540,7 +5540,7 @@
           <a:p>
             <a:fld id="{96D30BF6-FA71-4576-A5BC-BB4B1D1254CD}" type="datetimeFigureOut">
               <a:rPr lang="pl-PL" smtClean="0"/>
-              <a:t>14.05.2020</a:t>
+              <a:t>07.07.2020</a:t>
             </a:fld>
             <a:endParaRPr lang="pl-PL"/>
           </a:p>
@@ -5966,7 +5966,7 @@
           <a:p>
             <a:fld id="{96D30BF6-FA71-4576-A5BC-BB4B1D1254CD}" type="datetimeFigureOut">
               <a:rPr lang="pl-PL" smtClean="0"/>
-              <a:t>14.05.2020</a:t>
+              <a:t>07.07.2020</a:t>
             </a:fld>
             <a:endParaRPr lang="pl-PL"/>
           </a:p>
@@ -6512,7 +6512,7 @@
           <a:p>
             <a:fld id="{96D30BF6-FA71-4576-A5BC-BB4B1D1254CD}" type="datetimeFigureOut">
               <a:rPr lang="pl-PL" smtClean="0"/>
-              <a:t>14.05.2020</a:t>
+              <a:t>07.07.2020</a:t>
             </a:fld>
             <a:endParaRPr lang="pl-PL"/>
           </a:p>
@@ -7343,7 +7343,7 @@
           <a:p>
             <a:fld id="{96D30BF6-FA71-4576-A5BC-BB4B1D1254CD}" type="datetimeFigureOut">
               <a:rPr lang="pl-PL" smtClean="0"/>
-              <a:t>14.05.2020</a:t>
+              <a:t>07.07.2020</a:t>
             </a:fld>
             <a:endParaRPr lang="pl-PL"/>
           </a:p>
@@ -7513,7 +7513,7 @@
           <a:p>
             <a:fld id="{96D30BF6-FA71-4576-A5BC-BB4B1D1254CD}" type="datetimeFigureOut">
               <a:rPr lang="pl-PL" smtClean="0"/>
-              <a:t>14.05.2020</a:t>
+              <a:t>07.07.2020</a:t>
             </a:fld>
             <a:endParaRPr lang="pl-PL"/>
           </a:p>
@@ -7693,7 +7693,7 @@
           <a:p>
             <a:fld id="{96D30BF6-FA71-4576-A5BC-BB4B1D1254CD}" type="datetimeFigureOut">
               <a:rPr lang="pl-PL" smtClean="0"/>
-              <a:t>14.05.2020</a:t>
+              <a:t>07.07.2020</a:t>
             </a:fld>
             <a:endParaRPr lang="pl-PL"/>
           </a:p>
@@ -7868,7 +7868,7 @@
           <a:p>
             <a:fld id="{96D30BF6-FA71-4576-A5BC-BB4B1D1254CD}" type="datetimeFigureOut">
               <a:rPr lang="pl-PL" smtClean="0"/>
-              <a:t>14.05.2020</a:t>
+              <a:t>07.07.2020</a:t>
             </a:fld>
             <a:endParaRPr lang="pl-PL"/>
           </a:p>
@@ -8125,7 +8125,7 @@
           <a:p>
             <a:fld id="{96D30BF6-FA71-4576-A5BC-BB4B1D1254CD}" type="datetimeFigureOut">
               <a:rPr lang="pl-PL" smtClean="0"/>
-              <a:t>14.05.2020</a:t>
+              <a:t>07.07.2020</a:t>
             </a:fld>
             <a:endParaRPr lang="pl-PL"/>
           </a:p>
@@ -8362,7 +8362,7 @@
           <a:p>
             <a:fld id="{96D30BF6-FA71-4576-A5BC-BB4B1D1254CD}" type="datetimeFigureOut">
               <a:rPr lang="pl-PL" smtClean="0"/>
-              <a:t>14.05.2020</a:t>
+              <a:t>07.07.2020</a:t>
             </a:fld>
             <a:endParaRPr lang="pl-PL"/>
           </a:p>
@@ -8755,7 +8755,7 @@
           <a:p>
             <a:fld id="{96D30BF6-FA71-4576-A5BC-BB4B1D1254CD}" type="datetimeFigureOut">
               <a:rPr lang="pl-PL" smtClean="0"/>
-              <a:t>14.05.2020</a:t>
+              <a:t>07.07.2020</a:t>
             </a:fld>
             <a:endParaRPr lang="pl-PL"/>
           </a:p>
@@ -8873,7 +8873,7 @@
           <a:p>
             <a:fld id="{96D30BF6-FA71-4576-A5BC-BB4B1D1254CD}" type="datetimeFigureOut">
               <a:rPr lang="pl-PL" smtClean="0"/>
-              <a:t>14.05.2020</a:t>
+              <a:t>07.07.2020</a:t>
             </a:fld>
             <a:endParaRPr lang="pl-PL"/>
           </a:p>
@@ -8968,7 +8968,7 @@
           <a:p>
             <a:fld id="{96D30BF6-FA71-4576-A5BC-BB4B1D1254CD}" type="datetimeFigureOut">
               <a:rPr lang="pl-PL" smtClean="0"/>
-              <a:t>14.05.2020</a:t>
+              <a:t>07.07.2020</a:t>
             </a:fld>
             <a:endParaRPr lang="pl-PL"/>
           </a:p>
@@ -9241,7 +9241,7 @@
           <a:p>
             <a:fld id="{96D30BF6-FA71-4576-A5BC-BB4B1D1254CD}" type="datetimeFigureOut">
               <a:rPr lang="pl-PL" smtClean="0"/>
-              <a:t>14.05.2020</a:t>
+              <a:t>07.07.2020</a:t>
             </a:fld>
             <a:endParaRPr lang="pl-PL"/>
           </a:p>
@@ -9522,7 +9522,7 @@
           <a:p>
             <a:fld id="{96D30BF6-FA71-4576-A5BC-BB4B1D1254CD}" type="datetimeFigureOut">
               <a:rPr lang="pl-PL" smtClean="0"/>
-              <a:t>14.05.2020</a:t>
+              <a:t>07.07.2020</a:t>
             </a:fld>
             <a:endParaRPr lang="pl-PL"/>
           </a:p>
@@ -9762,7 +9762,7 @@
           <a:p>
             <a:fld id="{96D30BF6-FA71-4576-A5BC-BB4B1D1254CD}" type="datetimeFigureOut">
               <a:rPr lang="pl-PL" smtClean="0"/>
-              <a:t>14.05.2020</a:t>
+              <a:t>07.07.2020</a:t>
             </a:fld>
             <a:endParaRPr lang="pl-PL"/>
           </a:p>
@@ -13778,7 +13778,7 @@
             </a:r>
             <a:r>
               <a:rPr lang="pl-PL" dirty="0" err="1"/>
-              <a:t>compsition</a:t>
+              <a:t>composition</a:t>
             </a:r>
             <a:r>
               <a:rPr lang="pl-PL" dirty="0"/>
@@ -15218,6 +15218,12 @@
 </file>
 
 <file path=customXml/item1.xml><?xml version="1.0" encoding="utf-8"?>
+<p:properties xmlns:p="http://schemas.microsoft.com/office/2006/metadata/properties" xmlns:xsi="http://www.w3.org/2001/XMLSchema-instance" xmlns:pc="http://schemas.microsoft.com/office/infopath/2007/PartnerControls">
+  <documentManagement/>
+</p:properties>
+</file>
+
+<file path=customXml/item2.xml><?xml version="1.0" encoding="utf-8"?>
 <ct:contentTypeSchema xmlns:ct="http://schemas.microsoft.com/office/2006/metadata/contentType" xmlns:ma="http://schemas.microsoft.com/office/2006/metadata/properties/metaAttributes" ct:_="" ma:_="" ma:contentTypeName="Document" ma:contentTypeID="0x0101005184BFB4BA16AE4A9EE3C8BEF74D50A3" ma:contentTypeVersion="0" ma:contentTypeDescription="Create a new document." ma:contentTypeScope="" ma:versionID="d720147679065e31ecdf65c55fc0bc3a">
   <xsd:schema xmlns:xsd="http://www.w3.org/2001/XMLSchema" xmlns:xs="http://www.w3.org/2001/XMLSchema" xmlns:p="http://schemas.microsoft.com/office/2006/metadata/properties" targetNamespace="http://schemas.microsoft.com/office/2006/metadata/properties" ma:root="true" ma:fieldsID="43a7841bbb0f157a6d10fa10cd875d67">
     <xsd:element name="properties">
@@ -15331,12 +15337,6 @@
 </ct:contentTypeSchema>
 </file>
 
-<file path=customXml/item2.xml><?xml version="1.0" encoding="utf-8"?>
-<p:properties xmlns:p="http://schemas.microsoft.com/office/2006/metadata/properties" xmlns:xsi="http://www.w3.org/2001/XMLSchema-instance" xmlns:pc="http://schemas.microsoft.com/office/infopath/2007/PartnerControls">
-  <documentManagement/>
-</p:properties>
-</file>
-
 <file path=customXml/item3.xml><?xml version="1.0" encoding="utf-8"?>
 <?mso-contentType ?>
 <FormTemplates xmlns="http://schemas.microsoft.com/sharepoint/v3/contenttype/forms">
@@ -15347,6 +15347,21 @@
 </file>
 
 <file path=customXml/itemProps1.xml><?xml version="1.0" encoding="utf-8"?>
+<ds:datastoreItem xmlns:ds="http://schemas.openxmlformats.org/officeDocument/2006/customXml" ds:itemID="{C31CB5AC-A9CE-4DFD-A397-B798A6EA1D99}">
+  <ds:schemaRefs>
+    <ds:schemaRef ds:uri="http://schemas.microsoft.com/office/2006/documentManagement/types"/>
+    <ds:schemaRef ds:uri="http://schemas.microsoft.com/office/2006/metadata/properties"/>
+    <ds:schemaRef ds:uri="http://schemas.openxmlformats.org/package/2006/metadata/core-properties"/>
+    <ds:schemaRef ds:uri="http://purl.org/dc/dcmitype/"/>
+    <ds:schemaRef ds:uri="http://purl.org/dc/terms/"/>
+    <ds:schemaRef ds:uri="http://purl.org/dc/elements/1.1/"/>
+    <ds:schemaRef ds:uri="http://schemas.microsoft.com/office/infopath/2007/PartnerControls"/>
+    <ds:schemaRef ds:uri="http://www.w3.org/XML/1998/namespace"/>
+  </ds:schemaRefs>
+</ds:datastoreItem>
+</file>
+
+<file path=customXml/itemProps2.xml><?xml version="1.0" encoding="utf-8"?>
 <ds:datastoreItem xmlns:ds="http://schemas.openxmlformats.org/officeDocument/2006/customXml" ds:itemID="{847A727C-7D80-4E88-AE0A-B9AE0A316E4A}">
   <ds:schemaRefs>
     <ds:schemaRef ds:uri="http://schemas.microsoft.com/office/2006/metadata/contentType"/>
@@ -15362,21 +15377,6 @@
 </ds:datastoreItem>
 </file>
 
-<file path=customXml/itemProps2.xml><?xml version="1.0" encoding="utf-8"?>
-<ds:datastoreItem xmlns:ds="http://schemas.openxmlformats.org/officeDocument/2006/customXml" ds:itemID="{C31CB5AC-A9CE-4DFD-A397-B798A6EA1D99}">
-  <ds:schemaRefs>
-    <ds:schemaRef ds:uri="http://schemas.microsoft.com/office/2006/documentManagement/types"/>
-    <ds:schemaRef ds:uri="http://schemas.microsoft.com/office/2006/metadata/properties"/>
-    <ds:schemaRef ds:uri="http://schemas.openxmlformats.org/package/2006/metadata/core-properties"/>
-    <ds:schemaRef ds:uri="http://purl.org/dc/dcmitype/"/>
-    <ds:schemaRef ds:uri="http://purl.org/dc/terms/"/>
-    <ds:schemaRef ds:uri="http://purl.org/dc/elements/1.1/"/>
-    <ds:schemaRef ds:uri="http://schemas.microsoft.com/office/infopath/2007/PartnerControls"/>
-    <ds:schemaRef ds:uri="http://www.w3.org/XML/1998/namespace"/>
-  </ds:schemaRefs>
-</ds:datastoreItem>
-</file>
-
 <file path=customXml/itemProps3.xml><?xml version="1.0" encoding="utf-8"?>
 <ds:datastoreItem xmlns:ds="http://schemas.openxmlformats.org/officeDocument/2006/customXml" ds:itemID="{8E1E654A-AF8B-4228-A505-3E86DDE44BB6}">
   <ds:schemaRefs>

</xml_diff>